<commit_message>
temp doc was modified.
</commit_message>
<xml_diff>
--- a/temp/【勉強会資料1】ベンダー修行自体に得たもののコピー.pptx
+++ b/temp/【勉強会資料1】ベンダー修行自体に得たもののコピー.pptx
@@ -5,10 +5,10 @@
     <p:sldMasterId id="2147483756" r:id="rId1"/>
   </p:sldMasterIdLst>
   <p:notesMasterIdLst>
-    <p:notesMasterId r:id="rId12"/>
+    <p:notesMasterId r:id="rId14"/>
   </p:notesMasterIdLst>
   <p:handoutMasterIdLst>
-    <p:handoutMasterId r:id="rId13"/>
+    <p:handoutMasterId r:id="rId15"/>
   </p:handoutMasterIdLst>
   <p:sldIdLst>
     <p:sldId id="256" r:id="rId2"/>
@@ -21,6 +21,8 @@
     <p:sldId id="261" r:id="rId9"/>
     <p:sldId id="264" r:id="rId10"/>
     <p:sldId id="265" r:id="rId11"/>
+    <p:sldId id="266" r:id="rId12"/>
+    <p:sldId id="267" r:id="rId13"/>
   </p:sldIdLst>
   <p:sldSz cx="12192000" cy="6858000"/>
   <p:notesSz cx="6858000" cy="9144000"/>
@@ -134,6 +136,8 @@
             <p14:sldId id="261"/>
             <p14:sldId id="264"/>
             <p14:sldId id="265"/>
+            <p14:sldId id="266"/>
+            <p14:sldId id="267"/>
           </p14:sldIdLst>
         </p14:section>
         <p14:section name="退職前勉強会資料② 技術から理解するMOBIUS - サーバーサイド編-" id="{1E7869E3-7B4C-9F42-AE06-2488163E8179}">
@@ -3022,7 +3026,7 @@
           <a:p>
             <a:fld id="{238B40C8-6AFC-1F47-8E61-72062BDF4D71}" type="datetimeFigureOut">
               <a:rPr kumimoji="1" lang="ja-JP" altLang="en-US" smtClean="0"/>
-              <a:t>2018/6/10</a:t>
+              <a:t>2018/6/15</a:t>
             </a:fld>
             <a:endParaRPr kumimoji="1" lang="ja-JP" altLang="en-US"/>
           </a:p>
@@ -3200,7 +3204,7 @@
           <a:p>
             <a:fld id="{D3B83641-4FAC-2341-9A57-42FFC419962F}" type="datetimeFigureOut">
               <a:rPr kumimoji="1" lang="ja-JP" altLang="en-US" smtClean="0"/>
-              <a:t>2018/6/10</a:t>
+              <a:t>2018/6/15</a:t>
             </a:fld>
             <a:endParaRPr kumimoji="1" lang="ja-JP" altLang="en-US"/>
           </a:p>
@@ -3698,7 +3702,7 @@
           <a:p>
             <a:fld id="{5B2CE566-7076-0C41-9AD9-E654C7E87B37}" type="datetime1">
               <a:rPr kumimoji="1" lang="ja-JP" altLang="en-US" smtClean="0"/>
-              <a:t>2018/6/10</a:t>
+              <a:t>2018/6/15</a:t>
             </a:fld>
             <a:endParaRPr kumimoji="1" lang="ja-JP" altLang="en-US"/>
           </a:p>
@@ -3917,7 +3921,7 @@
           <a:p>
             <a:fld id="{D1D7F26A-BB78-6E4E-8CA3-E41E79F9F812}" type="datetime1">
               <a:rPr kumimoji="1" lang="ja-JP" altLang="en-US" smtClean="0"/>
-              <a:t>2018/6/10</a:t>
+              <a:t>2018/6/15</a:t>
             </a:fld>
             <a:endParaRPr kumimoji="1" lang="ja-JP" altLang="en-US"/>
           </a:p>
@@ -4140,7 +4144,7 @@
           <a:p>
             <a:fld id="{7042A67E-8144-5648-8835-2C8C1E3B4FE1}" type="datetime1">
               <a:rPr kumimoji="1" lang="ja-JP" altLang="en-US" smtClean="0"/>
-              <a:t>2018/6/10</a:t>
+              <a:t>2018/6/15</a:t>
             </a:fld>
             <a:endParaRPr kumimoji="1" lang="ja-JP" altLang="en-US"/>
           </a:p>
@@ -4420,7 +4424,7 @@
           <a:p>
             <a:fld id="{389258D5-C851-B444-BF8E-DF844752EFAF}" type="datetime1">
               <a:rPr kumimoji="1" lang="ja-JP" altLang="en-US" smtClean="0"/>
-              <a:t>2018/6/10</a:t>
+              <a:t>2018/6/15</a:t>
             </a:fld>
             <a:endParaRPr kumimoji="1" lang="ja-JP" altLang="en-US"/>
           </a:p>
@@ -4740,7 +4744,7 @@
           <a:p>
             <a:fld id="{77259ED6-757B-B44E-BD9A-E3770D736527}" type="datetime1">
               <a:rPr kumimoji="1" lang="ja-JP" altLang="en-US" smtClean="0"/>
-              <a:t>2018/6/10</a:t>
+              <a:t>2018/6/15</a:t>
             </a:fld>
             <a:endParaRPr kumimoji="1" lang="ja-JP" altLang="en-US"/>
           </a:p>
@@ -5024,7 +5028,7 @@
           <a:p>
             <a:fld id="{83B71520-C349-C047-9CED-EA3B414757B8}" type="datetime1">
               <a:rPr kumimoji="1" lang="ja-JP" altLang="en-US" smtClean="0"/>
-              <a:t>2018/6/10</a:t>
+              <a:t>2018/6/15</a:t>
             </a:fld>
             <a:endParaRPr kumimoji="1" lang="ja-JP" altLang="en-US"/>
           </a:p>
@@ -5530,7 +5534,7 @@
           <a:p>
             <a:fld id="{A9528EA2-2981-3B42-9E6F-A8EC87BFA6A1}" type="datetime1">
               <a:rPr kumimoji="1" lang="ja-JP" altLang="en-US" smtClean="0"/>
-              <a:t>2018/6/10</a:t>
+              <a:t>2018/6/15</a:t>
             </a:fld>
             <a:endParaRPr kumimoji="1" lang="ja-JP" altLang="en-US"/>
           </a:p>
@@ -5679,7 +5683,7 @@
           <a:p>
             <a:fld id="{3F5961C6-926E-F94D-83AC-ACCABA8E86D2}" type="datetime1">
               <a:rPr kumimoji="1" lang="ja-JP" altLang="en-US" smtClean="0"/>
-              <a:t>2018/6/10</a:t>
+              <a:t>2018/6/15</a:t>
             </a:fld>
             <a:endParaRPr kumimoji="1" lang="ja-JP" altLang="en-US"/>
           </a:p>
@@ -5805,7 +5809,7 @@
           <a:p>
             <a:fld id="{A3F8793D-FF65-ED40-8B7F-6E005A448B96}" type="datetime1">
               <a:rPr kumimoji="1" lang="ja-JP" altLang="en-US" smtClean="0"/>
-              <a:t>2018/6/10</a:t>
+              <a:t>2018/6/15</a:t>
             </a:fld>
             <a:endParaRPr kumimoji="1" lang="ja-JP" altLang="en-US"/>
           </a:p>
@@ -6101,7 +6105,7 @@
           <a:p>
             <a:fld id="{157B669D-B7B4-E441-AF8D-00B7C43606C3}" type="datetime1">
               <a:rPr kumimoji="1" lang="ja-JP" altLang="en-US" smtClean="0"/>
-              <a:t>2018/6/10</a:t>
+              <a:t>2018/6/15</a:t>
             </a:fld>
             <a:endParaRPr kumimoji="1" lang="ja-JP" altLang="en-US"/>
           </a:p>
@@ -6583,7 +6587,7 @@
           <a:p>
             <a:fld id="{92799E91-B3AC-B042-9083-5DCBA1A217EB}" type="datetime1">
               <a:rPr kumimoji="1" lang="ja-JP" altLang="en-US" smtClean="0"/>
-              <a:t>2018/6/10</a:t>
+              <a:t>2018/6/15</a:t>
             </a:fld>
             <a:endParaRPr kumimoji="1" lang="ja-JP" altLang="en-US"/>
           </a:p>
@@ -6909,7 +6913,7 @@
           <a:p>
             <a:fld id="{68ACE78F-E80D-564C-8F55-5F983A833C67}" type="datetime1">
               <a:rPr kumimoji="1" lang="ja-JP" altLang="en-US" smtClean="0"/>
-              <a:t>2018/6/10</a:t>
+              <a:t>2018/6/15</a:t>
             </a:fld>
             <a:endParaRPr kumimoji="1" lang="ja-JP" altLang="en-US"/>
           </a:p>
@@ -7834,6 +7838,752 @@
     <p:extLst>
       <p:ext uri="{BB962C8B-B14F-4D97-AF65-F5344CB8AC3E}">
         <p14:creationId xmlns:p14="http://schemas.microsoft.com/office/powerpoint/2010/main" val="2420249352"/>
+      </p:ext>
+    </p:extLst>
+  </p:cSld>
+  <p:clrMapOvr>
+    <a:masterClrMapping/>
+  </p:clrMapOvr>
+</p:sld>
+</file>
+
+<file path=ppt/slides/slide11.xml><?xml version="1.0" encoding="utf-8"?>
+<p:sld xmlns:a="http://schemas.openxmlformats.org/drawingml/2006/main" xmlns:r="http://schemas.openxmlformats.org/officeDocument/2006/relationships" xmlns:p="http://schemas.openxmlformats.org/presentationml/2006/main">
+  <p:cSld>
+    <p:spTree>
+      <p:nvGrpSpPr>
+        <p:cNvPr id="1" name=""/>
+        <p:cNvGrpSpPr/>
+        <p:nvPr/>
+      </p:nvGrpSpPr>
+      <p:grpSpPr>
+        <a:xfrm>
+          <a:off x="0" y="0"/>
+          <a:ext cx="0" cy="0"/>
+          <a:chOff x="0" y="0"/>
+          <a:chExt cx="0" cy="0"/>
+        </a:xfrm>
+      </p:grpSpPr>
+      <p:sp>
+        <p:nvSpPr>
+          <p:cNvPr id="2" name="タイトル 1">
+            <a:extLst>
+              <a:ext uri="{FF2B5EF4-FFF2-40B4-BE49-F238E27FC236}">
+                <a16:creationId xmlns:a16="http://schemas.microsoft.com/office/drawing/2014/main" id="{50883FF2-6654-C744-8344-81D920C5EEA1}"/>
+              </a:ext>
+            </a:extLst>
+          </p:cNvPr>
+          <p:cNvSpPr>
+            <a:spLocks noGrp="1"/>
+          </p:cNvSpPr>
+          <p:nvPr>
+            <p:ph type="title"/>
+          </p:nvPr>
+        </p:nvSpPr>
+        <p:spPr>
+          <a:xfrm>
+            <a:off x="680225" y="804519"/>
+            <a:ext cx="8950663" cy="592035"/>
+          </a:xfrm>
+        </p:spPr>
+        <p:txBody>
+          <a:bodyPr>
+            <a:normAutofit/>
+          </a:bodyPr>
+          <a:lstStyle/>
+          <a:p>
+            <a:r>
+              <a:rPr kumimoji="1" lang="ja-JP" altLang="en-US"/>
+              <a:t>気づき②シス共部品間の連携部分は要注意</a:t>
+            </a:r>
+          </a:p>
+        </p:txBody>
+      </p:sp>
+      <p:sp>
+        <p:nvSpPr>
+          <p:cNvPr id="4" name="スライド番号プレースホルダー 3">
+            <a:extLst>
+              <a:ext uri="{FF2B5EF4-FFF2-40B4-BE49-F238E27FC236}">
+                <a16:creationId xmlns:a16="http://schemas.microsoft.com/office/drawing/2014/main" id="{AD805998-193E-0145-9AC3-54E546E882A8}"/>
+              </a:ext>
+            </a:extLst>
+          </p:cNvPr>
+          <p:cNvSpPr>
+            <a:spLocks noGrp="1"/>
+          </p:cNvSpPr>
+          <p:nvPr>
+            <p:ph type="sldNum" sz="quarter" idx="12"/>
+          </p:nvPr>
+        </p:nvSpPr>
+        <p:spPr/>
+        <p:txBody>
+          <a:bodyPr/>
+          <a:lstStyle/>
+          <a:p>
+            <a:fld id="{7C718892-8A2D-1641-9485-86E9D14BDF37}" type="slidenum">
+              <a:rPr kumimoji="1" lang="ja-JP" altLang="en-US" smtClean="0"/>
+              <a:t>10</a:t>
+            </a:fld>
+            <a:endParaRPr kumimoji="1" lang="ja-JP" altLang="en-US"/>
+          </a:p>
+        </p:txBody>
+      </p:sp>
+      <p:sp>
+        <p:nvSpPr>
+          <p:cNvPr id="6" name="フッター プレースホルダー 5">
+            <a:extLst>
+              <a:ext uri="{FF2B5EF4-FFF2-40B4-BE49-F238E27FC236}">
+                <a16:creationId xmlns:a16="http://schemas.microsoft.com/office/drawing/2014/main" id="{E208D571-AB15-7140-8D9E-F9865361250C}"/>
+              </a:ext>
+            </a:extLst>
+          </p:cNvPr>
+          <p:cNvSpPr>
+            <a:spLocks noGrp="1"/>
+          </p:cNvSpPr>
+          <p:nvPr>
+            <p:ph type="ftr" sz="quarter" idx="11"/>
+          </p:nvPr>
+        </p:nvSpPr>
+        <p:spPr/>
+        <p:txBody>
+          <a:bodyPr/>
+          <a:lstStyle/>
+          <a:p>
+            <a:r>
+              <a:rPr lang="ja-JP" altLang="en-US"/>
+              <a:t>開発概要</a:t>
+            </a:r>
+            <a:endParaRPr lang="en-US" altLang="ja-JP" dirty="0"/>
+          </a:p>
+        </p:txBody>
+      </p:sp>
+      <p:sp>
+        <p:nvSpPr>
+          <p:cNvPr id="7" name="コンテンツ プレースホルダー 6">
+            <a:extLst>
+              <a:ext uri="{FF2B5EF4-FFF2-40B4-BE49-F238E27FC236}">
+                <a16:creationId xmlns:a16="http://schemas.microsoft.com/office/drawing/2014/main" id="{138EE20A-2C22-0144-A1D0-C1B03B4992CE}"/>
+              </a:ext>
+            </a:extLst>
+          </p:cNvPr>
+          <p:cNvSpPr>
+            <a:spLocks noGrp="1"/>
+          </p:cNvSpPr>
+          <p:nvPr>
+            <p:ph idx="1"/>
+          </p:nvPr>
+        </p:nvSpPr>
+        <p:spPr/>
+        <p:txBody>
+          <a:bodyPr/>
+          <a:lstStyle/>
+          <a:p>
+            <a:pPr marL="0" indent="0">
+              <a:buNone/>
+            </a:pPr>
+            <a:r>
+              <a:rPr lang="ja-JP" altLang="en-US"/>
+              <a:t>一口にシス共部品と言っても、中身は様々。</a:t>
+            </a:r>
+            <a:endParaRPr lang="en-US" altLang="ja-JP" dirty="0"/>
+          </a:p>
+          <a:p>
+            <a:pPr marL="0" indent="0">
+              <a:buNone/>
+            </a:pPr>
+            <a:r>
+              <a:rPr lang="ja-JP" altLang="en-US"/>
+              <a:t>それゆえ、担当者も部品ごとに細かく別れていて、自分の担当でない部品については、互いに中身をききあっていて、必ずしも精通しているわけではありません。</a:t>
+            </a:r>
+          </a:p>
+        </p:txBody>
+      </p:sp>
+      <p:sp>
+        <p:nvSpPr>
+          <p:cNvPr id="8" name="テキスト ボックス 7">
+            <a:extLst>
+              <a:ext uri="{FF2B5EF4-FFF2-40B4-BE49-F238E27FC236}">
+                <a16:creationId xmlns:a16="http://schemas.microsoft.com/office/drawing/2014/main" id="{1222E8FA-F301-8343-A33D-72355FD69E34}"/>
+              </a:ext>
+            </a:extLst>
+          </p:cNvPr>
+          <p:cNvSpPr txBox="1"/>
+          <p:nvPr/>
+        </p:nvSpPr>
+        <p:spPr>
+          <a:xfrm>
+            <a:off x="680226" y="5321522"/>
+            <a:ext cx="1338580" cy="369332"/>
+          </a:xfrm>
+          <a:prstGeom prst="rect">
+            <a:avLst/>
+          </a:prstGeom>
+          <a:solidFill>
+            <a:schemeClr val="accent3"/>
+          </a:solidFill>
+          <a:ln w="38100">
+            <a:solidFill>
+              <a:schemeClr val="accent2"/>
+            </a:solidFill>
+          </a:ln>
+        </p:spPr>
+        <p:txBody>
+          <a:bodyPr wrap="square" rtlCol="0">
+            <a:spAutoFit/>
+          </a:bodyPr>
+          <a:lstStyle/>
+          <a:p>
+            <a:pPr algn="ctr"/>
+            <a:r>
+              <a:rPr kumimoji="1" lang="ja-JP" altLang="en-US"/>
+              <a:t>ポイント</a:t>
+            </a:r>
+          </a:p>
+        </p:txBody>
+      </p:sp>
+      <p:sp>
+        <p:nvSpPr>
+          <p:cNvPr id="10" name="テキスト ボックス 9">
+            <a:extLst>
+              <a:ext uri="{FF2B5EF4-FFF2-40B4-BE49-F238E27FC236}">
+                <a16:creationId xmlns:a16="http://schemas.microsoft.com/office/drawing/2014/main" id="{EB85BB75-539D-ED4A-9508-B14AEDDD7525}"/>
+              </a:ext>
+            </a:extLst>
+          </p:cNvPr>
+          <p:cNvSpPr txBox="1"/>
+          <p:nvPr/>
+        </p:nvSpPr>
+        <p:spPr>
+          <a:xfrm>
+            <a:off x="680225" y="5690854"/>
+            <a:ext cx="10838984" cy="646331"/>
+          </a:xfrm>
+          <a:prstGeom prst="rect">
+            <a:avLst/>
+          </a:prstGeom>
+          <a:solidFill>
+            <a:schemeClr val="accent1">
+              <a:lumMod val="20000"/>
+              <a:lumOff val="80000"/>
+            </a:schemeClr>
+          </a:solidFill>
+          <a:ln>
+            <a:solidFill>
+              <a:schemeClr val="accent2"/>
+            </a:solidFill>
+          </a:ln>
+        </p:spPr>
+        <p:txBody>
+          <a:bodyPr wrap="square" rtlCol="0">
+            <a:spAutoFit/>
+          </a:bodyPr>
+          <a:lstStyle/>
+          <a:p>
+            <a:r>
+              <a:rPr lang="ja-JP" altLang="en-US"/>
+              <a:t>他の</a:t>
+            </a:r>
+            <a:r>
+              <a:rPr lang="en-US" altLang="ja-JP" dirty="0"/>
+              <a:t>FW</a:t>
+            </a:r>
+            <a:r>
+              <a:rPr lang="ja-JP" altLang="en-US"/>
+              <a:t>を呼んでいる部分はレビューポイント。</a:t>
+            </a:r>
+            <a:endParaRPr lang="en-US" altLang="ja-JP" dirty="0"/>
+          </a:p>
+          <a:p>
+            <a:r>
+              <a:rPr lang="ja-JP" altLang="en-US"/>
+              <a:t>適切な機能を使っているか、機能が変更されていないかなど</a:t>
+            </a:r>
+            <a:endParaRPr kumimoji="1" lang="ja-JP" altLang="en-US"/>
+          </a:p>
+        </p:txBody>
+      </p:sp>
+      <p:grpSp>
+        <p:nvGrpSpPr>
+          <p:cNvPr id="13" name="グループ化 12">
+            <a:extLst>
+              <a:ext uri="{FF2B5EF4-FFF2-40B4-BE49-F238E27FC236}">
+                <a16:creationId xmlns:a16="http://schemas.microsoft.com/office/drawing/2014/main" id="{DC82D15A-2034-374A-8805-0A3E46B8BD7F}"/>
+              </a:ext>
+            </a:extLst>
+          </p:cNvPr>
+          <p:cNvGrpSpPr/>
+          <p:nvPr/>
+        </p:nvGrpSpPr>
+        <p:grpSpPr>
+          <a:xfrm>
+            <a:off x="10180629" y="5118953"/>
+            <a:ext cx="1338580" cy="774470"/>
+            <a:chOff x="10006627" y="4916384"/>
+            <a:chExt cx="1338580" cy="774470"/>
+          </a:xfrm>
+        </p:grpSpPr>
+        <p:sp>
+          <p:nvSpPr>
+            <p:cNvPr id="11" name="円/楕円 10">
+              <a:extLst>
+                <a:ext uri="{FF2B5EF4-FFF2-40B4-BE49-F238E27FC236}">
+                  <a16:creationId xmlns:a16="http://schemas.microsoft.com/office/drawing/2014/main" id="{F9E77EEC-9AA5-FA4D-A891-A9891D0B5221}"/>
+                </a:ext>
+              </a:extLst>
+            </p:cNvPr>
+            <p:cNvSpPr/>
+            <p:nvPr/>
+          </p:nvSpPr>
+          <p:spPr>
+            <a:xfrm>
+              <a:off x="10272156" y="4916384"/>
+              <a:ext cx="807522" cy="774470"/>
+            </a:xfrm>
+            <a:prstGeom prst="ellipse">
+              <a:avLst/>
+            </a:prstGeom>
+          </p:spPr>
+          <p:style>
+            <a:lnRef idx="3">
+              <a:schemeClr val="lt1"/>
+            </a:lnRef>
+            <a:fillRef idx="1">
+              <a:schemeClr val="accent6"/>
+            </a:fillRef>
+            <a:effectRef idx="1">
+              <a:schemeClr val="accent6"/>
+            </a:effectRef>
+            <a:fontRef idx="minor">
+              <a:schemeClr val="lt1"/>
+            </a:fontRef>
+          </p:style>
+          <p:txBody>
+            <a:bodyPr rtlCol="0" anchor="ctr"/>
+            <a:lstStyle/>
+            <a:p>
+              <a:pPr algn="ctr"/>
+              <a:endParaRPr kumimoji="1" lang="ja-JP" altLang="en-US" sz="900"/>
+            </a:p>
+          </p:txBody>
+        </p:sp>
+        <p:sp>
+          <p:nvSpPr>
+            <p:cNvPr id="12" name="テキスト ボックス 11">
+              <a:extLst>
+                <a:ext uri="{FF2B5EF4-FFF2-40B4-BE49-F238E27FC236}">
+                  <a16:creationId xmlns:a16="http://schemas.microsoft.com/office/drawing/2014/main" id="{8E2EA5EF-FB57-9D4F-8EEF-4293D6437078}"/>
+                </a:ext>
+              </a:extLst>
+            </p:cNvPr>
+            <p:cNvSpPr txBox="1"/>
+            <p:nvPr/>
+          </p:nvSpPr>
+          <p:spPr>
+            <a:xfrm>
+              <a:off x="10006627" y="5180508"/>
+              <a:ext cx="1338580" cy="246221"/>
+            </a:xfrm>
+            <a:prstGeom prst="rect">
+              <a:avLst/>
+            </a:prstGeom>
+            <a:noFill/>
+            <a:ln w="38100">
+              <a:noFill/>
+            </a:ln>
+          </p:spPr>
+          <p:txBody>
+            <a:bodyPr wrap="square" rtlCol="0">
+              <a:spAutoFit/>
+            </a:bodyPr>
+            <a:lstStyle/>
+            <a:p>
+              <a:pPr algn="ctr"/>
+              <a:r>
+                <a:rPr lang="ja-JP" altLang="en-US" sz="1000"/>
+                <a:t>レビューア</a:t>
+              </a:r>
+              <a:endParaRPr kumimoji="1" lang="ja-JP" altLang="en-US" sz="1000"/>
+            </a:p>
+          </p:txBody>
+        </p:sp>
+      </p:grpSp>
+    </p:spTree>
+    <p:extLst>
+      <p:ext uri="{BB962C8B-B14F-4D97-AF65-F5344CB8AC3E}">
+        <p14:creationId xmlns:p14="http://schemas.microsoft.com/office/powerpoint/2010/main" val="3629076419"/>
+      </p:ext>
+    </p:extLst>
+  </p:cSld>
+  <p:clrMapOvr>
+    <a:masterClrMapping/>
+  </p:clrMapOvr>
+</p:sld>
+</file>
+
+<file path=ppt/slides/slide12.xml><?xml version="1.0" encoding="utf-8"?>
+<p:sld xmlns:a="http://schemas.openxmlformats.org/drawingml/2006/main" xmlns:r="http://schemas.openxmlformats.org/officeDocument/2006/relationships" xmlns:p="http://schemas.openxmlformats.org/presentationml/2006/main">
+  <p:cSld>
+    <p:spTree>
+      <p:nvGrpSpPr>
+        <p:cNvPr id="1" name=""/>
+        <p:cNvGrpSpPr/>
+        <p:nvPr/>
+      </p:nvGrpSpPr>
+      <p:grpSpPr>
+        <a:xfrm>
+          <a:off x="0" y="0"/>
+          <a:ext cx="0" cy="0"/>
+          <a:chOff x="0" y="0"/>
+          <a:chExt cx="0" cy="0"/>
+        </a:xfrm>
+      </p:grpSpPr>
+      <p:sp>
+        <p:nvSpPr>
+          <p:cNvPr id="2" name="タイトル 1">
+            <a:extLst>
+              <a:ext uri="{FF2B5EF4-FFF2-40B4-BE49-F238E27FC236}">
+                <a16:creationId xmlns:a16="http://schemas.microsoft.com/office/drawing/2014/main" id="{50883FF2-6654-C744-8344-81D920C5EEA1}"/>
+              </a:ext>
+            </a:extLst>
+          </p:cNvPr>
+          <p:cNvSpPr>
+            <a:spLocks noGrp="1"/>
+          </p:cNvSpPr>
+          <p:nvPr>
+            <p:ph type="title"/>
+          </p:nvPr>
+        </p:nvSpPr>
+        <p:spPr>
+          <a:xfrm>
+            <a:off x="680225" y="804519"/>
+            <a:ext cx="9295048" cy="592035"/>
+          </a:xfrm>
+        </p:spPr>
+        <p:txBody>
+          <a:bodyPr>
+            <a:normAutofit fontScale="90000"/>
+          </a:bodyPr>
+          <a:lstStyle/>
+          <a:p>
+            <a:r>
+              <a:rPr kumimoji="1" lang="ja-JP" altLang="en-US"/>
+              <a:t>気づき３　基本設計書は設計書の根拠も書く</a:t>
+            </a:r>
+          </a:p>
+        </p:txBody>
+      </p:sp>
+      <p:sp>
+        <p:nvSpPr>
+          <p:cNvPr id="4" name="スライド番号プレースホルダー 3">
+            <a:extLst>
+              <a:ext uri="{FF2B5EF4-FFF2-40B4-BE49-F238E27FC236}">
+                <a16:creationId xmlns:a16="http://schemas.microsoft.com/office/drawing/2014/main" id="{AD805998-193E-0145-9AC3-54E546E882A8}"/>
+              </a:ext>
+            </a:extLst>
+          </p:cNvPr>
+          <p:cNvSpPr>
+            <a:spLocks noGrp="1"/>
+          </p:cNvSpPr>
+          <p:nvPr>
+            <p:ph type="sldNum" sz="quarter" idx="12"/>
+          </p:nvPr>
+        </p:nvSpPr>
+        <p:spPr/>
+        <p:txBody>
+          <a:bodyPr/>
+          <a:lstStyle/>
+          <a:p>
+            <a:fld id="{7C718892-8A2D-1641-9485-86E9D14BDF37}" type="slidenum">
+              <a:rPr kumimoji="1" lang="ja-JP" altLang="en-US" smtClean="0"/>
+              <a:t>11</a:t>
+            </a:fld>
+            <a:endParaRPr kumimoji="1" lang="ja-JP" altLang="en-US"/>
+          </a:p>
+        </p:txBody>
+      </p:sp>
+      <p:sp>
+        <p:nvSpPr>
+          <p:cNvPr id="6" name="フッター プレースホルダー 5">
+            <a:extLst>
+              <a:ext uri="{FF2B5EF4-FFF2-40B4-BE49-F238E27FC236}">
+                <a16:creationId xmlns:a16="http://schemas.microsoft.com/office/drawing/2014/main" id="{E208D571-AB15-7140-8D9E-F9865361250C}"/>
+              </a:ext>
+            </a:extLst>
+          </p:cNvPr>
+          <p:cNvSpPr>
+            <a:spLocks noGrp="1"/>
+          </p:cNvSpPr>
+          <p:nvPr>
+            <p:ph type="ftr" sz="quarter" idx="11"/>
+          </p:nvPr>
+        </p:nvSpPr>
+        <p:spPr/>
+        <p:txBody>
+          <a:bodyPr/>
+          <a:lstStyle/>
+          <a:p>
+            <a:r>
+              <a:rPr lang="ja-JP" altLang="en-US"/>
+              <a:t>開発概要</a:t>
+            </a:r>
+            <a:endParaRPr lang="en-US" altLang="ja-JP" dirty="0"/>
+          </a:p>
+        </p:txBody>
+      </p:sp>
+      <p:sp>
+        <p:nvSpPr>
+          <p:cNvPr id="7" name="コンテンツ プレースホルダー 6">
+            <a:extLst>
+              <a:ext uri="{FF2B5EF4-FFF2-40B4-BE49-F238E27FC236}">
+                <a16:creationId xmlns:a16="http://schemas.microsoft.com/office/drawing/2014/main" id="{138EE20A-2C22-0144-A1D0-C1B03B4992CE}"/>
+              </a:ext>
+            </a:extLst>
+          </p:cNvPr>
+          <p:cNvSpPr>
+            <a:spLocks noGrp="1"/>
+          </p:cNvSpPr>
+          <p:nvPr>
+            <p:ph idx="1"/>
+          </p:nvPr>
+        </p:nvSpPr>
+        <p:spPr/>
+        <p:txBody>
+          <a:bodyPr/>
+          <a:lstStyle/>
+          <a:p>
+            <a:pPr marL="0" indent="0">
+              <a:buNone/>
+            </a:pPr>
+            <a:r>
+              <a:rPr lang="ja-JP" altLang="en-US"/>
+              <a:t>基本設計書で機能概要などを書いていると、その機能が「どういう作りか」という視点でのみ書きがちですが、「なぜその作りにしたか」という視点で書くべきと感じます。</a:t>
+            </a:r>
+            <a:endParaRPr lang="en-US" altLang="ja-JP" dirty="0"/>
+          </a:p>
+          <a:p>
+            <a:pPr marL="0" indent="0">
+              <a:buNone/>
+            </a:pPr>
+            <a:r>
+              <a:rPr lang="ja-JP" altLang="en-US"/>
+              <a:t>そうでないと、第三者が見たときにその設計の妥当性を確認できません。</a:t>
+            </a:r>
+          </a:p>
+        </p:txBody>
+      </p:sp>
+      <p:sp>
+        <p:nvSpPr>
+          <p:cNvPr id="8" name="テキスト ボックス 7">
+            <a:extLst>
+              <a:ext uri="{FF2B5EF4-FFF2-40B4-BE49-F238E27FC236}">
+                <a16:creationId xmlns:a16="http://schemas.microsoft.com/office/drawing/2014/main" id="{1222E8FA-F301-8343-A33D-72355FD69E34}"/>
+              </a:ext>
+            </a:extLst>
+          </p:cNvPr>
+          <p:cNvSpPr txBox="1"/>
+          <p:nvPr/>
+        </p:nvSpPr>
+        <p:spPr>
+          <a:xfrm>
+            <a:off x="680226" y="5321522"/>
+            <a:ext cx="1338580" cy="369332"/>
+          </a:xfrm>
+          <a:prstGeom prst="rect">
+            <a:avLst/>
+          </a:prstGeom>
+          <a:solidFill>
+            <a:schemeClr val="accent3"/>
+          </a:solidFill>
+          <a:ln w="38100">
+            <a:solidFill>
+              <a:schemeClr val="accent2"/>
+            </a:solidFill>
+          </a:ln>
+        </p:spPr>
+        <p:txBody>
+          <a:bodyPr wrap="square" rtlCol="0">
+            <a:spAutoFit/>
+          </a:bodyPr>
+          <a:lstStyle/>
+          <a:p>
+            <a:pPr algn="ctr"/>
+            <a:r>
+              <a:rPr kumimoji="1" lang="ja-JP" altLang="en-US"/>
+              <a:t>ポイント</a:t>
+            </a:r>
+          </a:p>
+        </p:txBody>
+      </p:sp>
+      <p:sp>
+        <p:nvSpPr>
+          <p:cNvPr id="10" name="テキスト ボックス 9">
+            <a:extLst>
+              <a:ext uri="{FF2B5EF4-FFF2-40B4-BE49-F238E27FC236}">
+                <a16:creationId xmlns:a16="http://schemas.microsoft.com/office/drawing/2014/main" id="{EB85BB75-539D-ED4A-9508-B14AEDDD7525}"/>
+              </a:ext>
+            </a:extLst>
+          </p:cNvPr>
+          <p:cNvSpPr txBox="1"/>
+          <p:nvPr/>
+        </p:nvSpPr>
+        <p:spPr>
+          <a:xfrm>
+            <a:off x="680225" y="5690854"/>
+            <a:ext cx="10838984" cy="646331"/>
+          </a:xfrm>
+          <a:prstGeom prst="rect">
+            <a:avLst/>
+          </a:prstGeom>
+          <a:solidFill>
+            <a:schemeClr val="accent1">
+              <a:lumMod val="20000"/>
+              <a:lumOff val="80000"/>
+            </a:schemeClr>
+          </a:solidFill>
+          <a:ln>
+            <a:solidFill>
+              <a:schemeClr val="accent2"/>
+            </a:solidFill>
+          </a:ln>
+        </p:spPr>
+        <p:txBody>
+          <a:bodyPr wrap="square" rtlCol="0">
+            <a:spAutoFit/>
+          </a:bodyPr>
+          <a:lstStyle/>
+          <a:p>
+            <a:r>
+              <a:rPr lang="ja-JP" altLang="en-US"/>
+              <a:t>他の</a:t>
+            </a:r>
+            <a:r>
+              <a:rPr lang="en-US" altLang="ja-JP" dirty="0"/>
+              <a:t>FW</a:t>
+            </a:r>
+            <a:r>
+              <a:rPr lang="ja-JP" altLang="en-US"/>
+              <a:t>を呼んでいる部分はレビューポイント。</a:t>
+            </a:r>
+            <a:endParaRPr lang="en-US" altLang="ja-JP" dirty="0"/>
+          </a:p>
+          <a:p>
+            <a:r>
+              <a:rPr lang="ja-JP" altLang="en-US"/>
+              <a:t>適切な機能を使っているか、機能が変更されていないかなど</a:t>
+            </a:r>
+            <a:endParaRPr kumimoji="1" lang="ja-JP" altLang="en-US"/>
+          </a:p>
+        </p:txBody>
+      </p:sp>
+      <p:grpSp>
+        <p:nvGrpSpPr>
+          <p:cNvPr id="13" name="グループ化 12">
+            <a:extLst>
+              <a:ext uri="{FF2B5EF4-FFF2-40B4-BE49-F238E27FC236}">
+                <a16:creationId xmlns:a16="http://schemas.microsoft.com/office/drawing/2014/main" id="{DC82D15A-2034-374A-8805-0A3E46B8BD7F}"/>
+              </a:ext>
+            </a:extLst>
+          </p:cNvPr>
+          <p:cNvGrpSpPr/>
+          <p:nvPr/>
+        </p:nvGrpSpPr>
+        <p:grpSpPr>
+          <a:xfrm>
+            <a:off x="10180629" y="5118953"/>
+            <a:ext cx="1338580" cy="774470"/>
+            <a:chOff x="10006627" y="4916384"/>
+            <a:chExt cx="1338580" cy="774470"/>
+          </a:xfrm>
+        </p:grpSpPr>
+        <p:sp>
+          <p:nvSpPr>
+            <p:cNvPr id="11" name="円/楕円 10">
+              <a:extLst>
+                <a:ext uri="{FF2B5EF4-FFF2-40B4-BE49-F238E27FC236}">
+                  <a16:creationId xmlns:a16="http://schemas.microsoft.com/office/drawing/2014/main" id="{F9E77EEC-9AA5-FA4D-A891-A9891D0B5221}"/>
+                </a:ext>
+              </a:extLst>
+            </p:cNvPr>
+            <p:cNvSpPr/>
+            <p:nvPr/>
+          </p:nvSpPr>
+          <p:spPr>
+            <a:xfrm>
+              <a:off x="10272156" y="4916384"/>
+              <a:ext cx="807522" cy="774470"/>
+            </a:xfrm>
+            <a:prstGeom prst="ellipse">
+              <a:avLst/>
+            </a:prstGeom>
+          </p:spPr>
+          <p:style>
+            <a:lnRef idx="3">
+              <a:schemeClr val="lt1"/>
+            </a:lnRef>
+            <a:fillRef idx="1">
+              <a:schemeClr val="accent6"/>
+            </a:fillRef>
+            <a:effectRef idx="1">
+              <a:schemeClr val="accent6"/>
+            </a:effectRef>
+            <a:fontRef idx="minor">
+              <a:schemeClr val="lt1"/>
+            </a:fontRef>
+          </p:style>
+          <p:txBody>
+            <a:bodyPr rtlCol="0" anchor="ctr"/>
+            <a:lstStyle/>
+            <a:p>
+              <a:pPr algn="ctr"/>
+              <a:endParaRPr kumimoji="1" lang="ja-JP" altLang="en-US" sz="900"/>
+            </a:p>
+          </p:txBody>
+        </p:sp>
+        <p:sp>
+          <p:nvSpPr>
+            <p:cNvPr id="12" name="テキスト ボックス 11">
+              <a:extLst>
+                <a:ext uri="{FF2B5EF4-FFF2-40B4-BE49-F238E27FC236}">
+                  <a16:creationId xmlns:a16="http://schemas.microsoft.com/office/drawing/2014/main" id="{8E2EA5EF-FB57-9D4F-8EEF-4293D6437078}"/>
+                </a:ext>
+              </a:extLst>
+            </p:cNvPr>
+            <p:cNvSpPr txBox="1"/>
+            <p:nvPr/>
+          </p:nvSpPr>
+          <p:spPr>
+            <a:xfrm>
+              <a:off x="10006627" y="5180508"/>
+              <a:ext cx="1338580" cy="246221"/>
+            </a:xfrm>
+            <a:prstGeom prst="rect">
+              <a:avLst/>
+            </a:prstGeom>
+            <a:noFill/>
+            <a:ln w="38100">
+              <a:noFill/>
+            </a:ln>
+          </p:spPr>
+          <p:txBody>
+            <a:bodyPr wrap="square" rtlCol="0">
+              <a:spAutoFit/>
+            </a:bodyPr>
+            <a:lstStyle/>
+            <a:p>
+              <a:pPr algn="ctr"/>
+              <a:r>
+                <a:rPr lang="ja-JP" altLang="en-US" sz="1000"/>
+                <a:t>レビューア</a:t>
+              </a:r>
+              <a:endParaRPr kumimoji="1" lang="ja-JP" altLang="en-US" sz="1000"/>
+            </a:p>
+          </p:txBody>
+        </p:sp>
+      </p:grpSp>
+    </p:spTree>
+    <p:extLst>
+      <p:ext uri="{BB962C8B-B14F-4D97-AF65-F5344CB8AC3E}">
+        <p14:creationId xmlns:p14="http://schemas.microsoft.com/office/powerpoint/2010/main" val="1727717986"/>
       </p:ext>
     </p:extLst>
   </p:cSld>

</xml_diff>